<commit_message>
[BackEnd] - CRUD changes
The backend team gathered in discord and made the following changes:
Main.py:
Changes to make it work with "costumer" table

Customer.py (Name subject to changes)
Added the CRUD for each table of the DB
</commit_message>
<xml_diff>
--- a/documents/Apresentação_22_11.pptx
+++ b/documents/Apresentação_22_11.pptx
@@ -4949,7 +4949,7 @@
         </p:blipFill>
         <p:spPr>
           <a:xfrm>
-            <a:off x="871855" y="1597660"/>
+            <a:off x="871855" y="1668780"/>
             <a:ext cx="7553960" cy="4716145"/>
           </a:xfrm>
           <a:prstGeom prst="rect">
@@ -5517,7 +5517,7 @@
             </a:r>
             <a:r>
               <a:rPr lang="pt-PT" altLang="en-US" sz="1200"/>
-              <a:t>ficheiros retirados 21/11 do github as 15:51</a:t>
+              <a:t>ficheiros retirados 21/11 do github às 15:51</a:t>
             </a:r>
             <a:endParaRPr lang="pt-PT" altLang="en-US" sz="1200"/>
           </a:p>

</xml_diff>